<commit_message>
Church-s thesis ==> Church-Turing thesis
</commit_message>
<xml_diff>
--- a/Agenda.pptx
+++ b/Agenda.pptx
@@ -265,7 +265,7 @@
           <a:p>
             <a:fld id="{B912D0AE-064D-4AF1-BBEB-61FB3726AD02}" type="datetimeFigureOut">
               <a:rPr lang="en-US" smtClean="0"/>
-              <a:t>12/8/2023</a:t>
+              <a:t>1/5/2024</a:t>
             </a:fld>
             <a:endParaRPr lang="en-US"/>
           </a:p>
@@ -463,7 +463,7 @@
           <a:p>
             <a:fld id="{B912D0AE-064D-4AF1-BBEB-61FB3726AD02}" type="datetimeFigureOut">
               <a:rPr lang="en-US" smtClean="0"/>
-              <a:t>12/8/2023</a:t>
+              <a:t>1/5/2024</a:t>
             </a:fld>
             <a:endParaRPr lang="en-US"/>
           </a:p>
@@ -671,7 +671,7 @@
           <a:p>
             <a:fld id="{B912D0AE-064D-4AF1-BBEB-61FB3726AD02}" type="datetimeFigureOut">
               <a:rPr lang="en-US" smtClean="0"/>
-              <a:t>12/8/2023</a:t>
+              <a:t>1/5/2024</a:t>
             </a:fld>
             <a:endParaRPr lang="en-US"/>
           </a:p>
@@ -869,7 +869,7 @@
           <a:p>
             <a:fld id="{B912D0AE-064D-4AF1-BBEB-61FB3726AD02}" type="datetimeFigureOut">
               <a:rPr lang="en-US" smtClean="0"/>
-              <a:t>12/8/2023</a:t>
+              <a:t>1/5/2024</a:t>
             </a:fld>
             <a:endParaRPr lang="en-US"/>
           </a:p>
@@ -1144,7 +1144,7 @@
           <a:p>
             <a:fld id="{B912D0AE-064D-4AF1-BBEB-61FB3726AD02}" type="datetimeFigureOut">
               <a:rPr lang="en-US" smtClean="0"/>
-              <a:t>12/8/2023</a:t>
+              <a:t>1/5/2024</a:t>
             </a:fld>
             <a:endParaRPr lang="en-US"/>
           </a:p>
@@ -1409,7 +1409,7 @@
           <a:p>
             <a:fld id="{B912D0AE-064D-4AF1-BBEB-61FB3726AD02}" type="datetimeFigureOut">
               <a:rPr lang="en-US" smtClean="0"/>
-              <a:t>12/8/2023</a:t>
+              <a:t>1/5/2024</a:t>
             </a:fld>
             <a:endParaRPr lang="en-US"/>
           </a:p>
@@ -1821,7 +1821,7 @@
           <a:p>
             <a:fld id="{B912D0AE-064D-4AF1-BBEB-61FB3726AD02}" type="datetimeFigureOut">
               <a:rPr lang="en-US" smtClean="0"/>
-              <a:t>12/8/2023</a:t>
+              <a:t>1/5/2024</a:t>
             </a:fld>
             <a:endParaRPr lang="en-US"/>
           </a:p>
@@ -1962,7 +1962,7 @@
           <a:p>
             <a:fld id="{B912D0AE-064D-4AF1-BBEB-61FB3726AD02}" type="datetimeFigureOut">
               <a:rPr lang="en-US" smtClean="0"/>
-              <a:t>12/8/2023</a:t>
+              <a:t>1/5/2024</a:t>
             </a:fld>
             <a:endParaRPr lang="en-US"/>
           </a:p>
@@ -2075,7 +2075,7 @@
           <a:p>
             <a:fld id="{B912D0AE-064D-4AF1-BBEB-61FB3726AD02}" type="datetimeFigureOut">
               <a:rPr lang="en-US" smtClean="0"/>
-              <a:t>12/8/2023</a:t>
+              <a:t>1/5/2024</a:t>
             </a:fld>
             <a:endParaRPr lang="en-US"/>
           </a:p>
@@ -2386,7 +2386,7 @@
           <a:p>
             <a:fld id="{B912D0AE-064D-4AF1-BBEB-61FB3726AD02}" type="datetimeFigureOut">
               <a:rPr lang="en-US" smtClean="0"/>
-              <a:t>12/8/2023</a:t>
+              <a:t>1/5/2024</a:t>
             </a:fld>
             <a:endParaRPr lang="en-US"/>
           </a:p>
@@ -2674,7 +2674,7 @@
           <a:p>
             <a:fld id="{B912D0AE-064D-4AF1-BBEB-61FB3726AD02}" type="datetimeFigureOut">
               <a:rPr lang="en-US" smtClean="0"/>
-              <a:t>12/8/2023</a:t>
+              <a:t>1/5/2024</a:t>
             </a:fld>
             <a:endParaRPr lang="en-US"/>
           </a:p>
@@ -2915,7 +2915,7 @@
           <a:p>
             <a:fld id="{B912D0AE-064D-4AF1-BBEB-61FB3726AD02}" type="datetimeFigureOut">
               <a:rPr lang="en-US" smtClean="0"/>
-              <a:t>12/8/2023</a:t>
+              <a:t>1/5/2024</a:t>
             </a:fld>
             <a:endParaRPr lang="en-US"/>
           </a:p>
@@ -4248,7 +4248,9 @@
         </p:nvSpPr>
         <p:spPr/>
         <p:txBody>
-          <a:bodyPr/>
+          <a:bodyPr>
+            <a:normAutofit/>
+          </a:bodyPr>
           <a:lstStyle/>
           <a:p>
             <a:pPr marL="0" indent="0">
@@ -4257,49 +4259,167 @@
             <a:endParaRPr lang="en-US" dirty="0"/>
           </a:p>
           <a:p>
+            <a:pPr marL="0" indent="0" rtl="0" latinLnBrk="0">
+              <a:lnSpc>
+                <a:spcPct val="90000"/>
+              </a:lnSpc>
+              <a:spcBef>
+                <a:spcPts val="1000"/>
+              </a:spcBef>
+              <a:spcAft>
+                <a:spcPts val="0"/>
+              </a:spcAft>
+              <a:buNone/>
+            </a:pPr>
+            <a:r>
+              <a:rPr lang="en-US" dirty="0">
+                <a:solidFill>
+                  <a:srgbClr val="000000"/>
+                </a:solidFill>
+                <a:effectLst/>
+                <a:latin typeface="Calibri" panose="020F0502020204030204" pitchFamily="34" charset="0"/>
+              </a:rPr>
+              <a:t>Basic Clarity - lisp-like language - prefix functions, contract scope</a:t>
+            </a:r>
+          </a:p>
+          <a:p>
             <a:pPr marL="0" indent="0">
               <a:buNone/>
             </a:pPr>
             <a:r>
               <a:rPr lang="en-US" dirty="0"/>
-              <a:t>45 minutes – basic clarity</a:t>
-            </a:r>
+              <a:t>    45 minutes</a:t>
+            </a:r>
+            <a:endParaRPr lang="en-US" dirty="0">
+              <a:effectLst/>
+            </a:endParaRPr>
+          </a:p>
+          <a:p>
+            <a:pPr marL="0" indent="0" rtl="0" latinLnBrk="0">
+              <a:lnSpc>
+                <a:spcPct val="90000"/>
+              </a:lnSpc>
+              <a:spcBef>
+                <a:spcPts val="1000"/>
+              </a:spcBef>
+              <a:spcAft>
+                <a:spcPts val="0"/>
+              </a:spcAft>
+              <a:buNone/>
+            </a:pPr>
+            <a:r>
+              <a:rPr lang="en-US" dirty="0">
+                <a:solidFill>
+                  <a:srgbClr val="000000"/>
+                </a:solidFill>
+                <a:effectLst/>
+                <a:latin typeface="Calibri" panose="020F0502020204030204" pitchFamily="34" charset="0"/>
+              </a:rPr>
+              <a:t>Factorial function – working without recursion and unbounded iteration</a:t>
+            </a:r>
+          </a:p>
+          <a:p>
+            <a:pPr marL="0" indent="0" rtl="0" latinLnBrk="0">
+              <a:lnSpc>
+                <a:spcPct val="90000"/>
+              </a:lnSpc>
+              <a:spcBef>
+                <a:spcPts val="1000"/>
+              </a:spcBef>
+              <a:spcAft>
+                <a:spcPts val="0"/>
+              </a:spcAft>
+              <a:buNone/>
+            </a:pPr>
+            <a:r>
+              <a:rPr lang="en-US" dirty="0">
+                <a:effectLst/>
+              </a:rPr>
+              <a:t>    </a:t>
+            </a:r>
+            <a:r>
+              <a:rPr lang="en-US" dirty="0"/>
+              <a:t>45 minutes</a:t>
+            </a:r>
+            <a:endParaRPr lang="en-US" dirty="0">
+              <a:effectLst/>
+            </a:endParaRPr>
+          </a:p>
+          <a:p>
+            <a:pPr marL="0" indent="0" rtl="0" latinLnBrk="0">
+              <a:lnSpc>
+                <a:spcPct val="90000"/>
+              </a:lnSpc>
+              <a:spcBef>
+                <a:spcPts val="1000"/>
+              </a:spcBef>
+              <a:spcAft>
+                <a:spcPts val="0"/>
+              </a:spcAft>
+              <a:buNone/>
+            </a:pPr>
+            <a:r>
+              <a:rPr lang="en-US" dirty="0">
+                <a:solidFill>
+                  <a:srgbClr val="000000"/>
+                </a:solidFill>
+                <a:effectLst/>
+                <a:latin typeface="Calibri" panose="020F0502020204030204" pitchFamily="34" charset="0"/>
+              </a:rPr>
+              <a:t>Time locked contract -  textbook example using </a:t>
+            </a:r>
+            <a:r>
+              <a:rPr lang="en-US" dirty="0" err="1">
+                <a:solidFill>
+                  <a:srgbClr val="000000"/>
+                </a:solidFill>
+                <a:effectLst/>
+                <a:latin typeface="Calibri" panose="020F0502020204030204" pitchFamily="34" charset="0"/>
+              </a:rPr>
+              <a:t>blockheight</a:t>
+            </a:r>
+            <a:r>
+              <a:rPr lang="en-US" dirty="0">
+                <a:solidFill>
+                  <a:srgbClr val="000000"/>
+                </a:solidFill>
+                <a:effectLst/>
+                <a:latin typeface="Calibri" panose="020F0502020204030204" pitchFamily="34" charset="0"/>
+              </a:rPr>
+              <a:t> and restricted access</a:t>
+            </a:r>
+          </a:p>
+          <a:p>
+            <a:pPr marL="0" indent="0" rtl="0" latinLnBrk="0">
+              <a:lnSpc>
+                <a:spcPct val="90000"/>
+              </a:lnSpc>
+              <a:spcBef>
+                <a:spcPts val="1000"/>
+              </a:spcBef>
+              <a:spcAft>
+                <a:spcPts val="0"/>
+              </a:spcAft>
+              <a:buNone/>
+            </a:pPr>
+            <a:r>
+              <a:rPr lang="en-US" dirty="0">
+                <a:solidFill>
+                  <a:srgbClr val="000000"/>
+                </a:solidFill>
+                <a:latin typeface="Calibri" panose="020F0502020204030204" pitchFamily="34" charset="0"/>
+              </a:rPr>
+              <a:t>    45 minutes</a:t>
+            </a:r>
+            <a:endParaRPr lang="en-US" dirty="0">
+              <a:effectLst/>
+            </a:endParaRPr>
           </a:p>
           <a:p>
             <a:pPr marL="0" indent="0">
               <a:buNone/>
             </a:pPr>
-            <a:r>
-              <a:rPr lang="en-US" dirty="0"/>
-              <a:t>	15 minute break</a:t>
-            </a:r>
-          </a:p>
-          <a:p>
-            <a:pPr marL="0" indent="0">
-              <a:buNone/>
-            </a:pPr>
-            <a:r>
-              <a:rPr lang="en-US" dirty="0"/>
-              <a:t>45 minutes – factorial function</a:t>
-            </a:r>
-          </a:p>
-          <a:p>
-            <a:pPr marL="0" indent="0">
-              <a:buNone/>
-            </a:pPr>
-            <a:r>
-              <a:rPr lang="en-US" dirty="0"/>
-              <a:t>	15 minute break</a:t>
-            </a:r>
-          </a:p>
-          <a:p>
-            <a:pPr marL="0" indent="0">
-              <a:buNone/>
-            </a:pPr>
-            <a:r>
-              <a:rPr lang="en-US" dirty="0"/>
-              <a:t>45 minutes – time locked contract</a:t>
-            </a:r>
+            <a:endParaRPr lang="en-US" dirty="0"/>
           </a:p>
         </p:txBody>
       </p:sp>

</xml_diff>